<commit_message>
Added pdf and powerpoint
</commit_message>
<xml_diff>
--- a/documents/Week10/Presentation3_BigByteStudios.pptx
+++ b/documents/Week10/Presentation3_BigByteStudios.pptx
@@ -5886,30 +5886,26 @@
       </p:pic>
       <p:pic>
         <p:nvPicPr>
-          <p:cNvPr id="6" name="Picture 5"/>
+          <p:cNvPr id="3" name="Picture 2"/>
           <p:cNvPicPr>
             <a:picLocks noChangeAspect="1"/>
           </p:cNvPicPr>
           <p:nvPr/>
         </p:nvPicPr>
-        <p:blipFill rotWithShape="1">
+        <p:blipFill>
           <a:blip r:embed="rId5"/>
-          <a:srcRect l="14679" t="23208" r="17372" b="21426"/>
-          <a:stretch/>
+          <a:stretch>
+            <a:fillRect/>
+          </a:stretch>
         </p:blipFill>
         <p:spPr>
           <a:xfrm>
-            <a:off x="731590" y="1440626"/>
-            <a:ext cx="7992888" cy="4070460"/>
+            <a:off x="899592" y="1311017"/>
+            <a:ext cx="7777830" cy="4080487"/>
           </a:xfrm>
           <a:prstGeom prst="rect">
             <a:avLst/>
           </a:prstGeom>
-          <a:ln>
-            <a:solidFill>
-              <a:schemeClr val="accent1"/>
-            </a:solidFill>
-          </a:ln>
         </p:spPr>
       </p:pic>
     </p:spTree>
@@ -6106,30 +6102,26 @@
       </p:pic>
       <p:pic>
         <p:nvPicPr>
-          <p:cNvPr id="2" name="Picture 1"/>
+          <p:cNvPr id="3" name="Picture 2"/>
           <p:cNvPicPr>
             <a:picLocks noChangeAspect="1"/>
           </p:cNvPicPr>
           <p:nvPr/>
         </p:nvPicPr>
-        <p:blipFill rotWithShape="1">
+        <p:blipFill>
           <a:blip r:embed="rId5"/>
-          <a:srcRect l="8151" t="31280" r="11750" b="34161"/>
-          <a:stretch/>
+          <a:stretch>
+            <a:fillRect/>
+          </a:stretch>
         </p:blipFill>
         <p:spPr>
           <a:xfrm>
-            <a:off x="683568" y="1461031"/>
-            <a:ext cx="7848872" cy="2116549"/>
+            <a:off x="971600" y="1025312"/>
+            <a:ext cx="7097360" cy="3200201"/>
           </a:xfrm>
           <a:prstGeom prst="rect">
             <a:avLst/>
           </a:prstGeom>
-          <a:ln>
-            <a:solidFill>
-              <a:schemeClr val="accent1"/>
-            </a:solidFill>
-          </a:ln>
         </p:spPr>
       </p:pic>
     </p:spTree>

</xml_diff>